<commit_message>
Done section on capacitors
Missing review, checkpopint ideas, summary
</commit_message>
<xml_diff>
--- a/tex/figures/Potential/Figures.pptx
+++ b/tex/figures/Potential/Figures.pptx
@@ -15935,6 +15935,1111 @@
           <a:chExt cx="0" cy="0"/>
         </a:xfrm>
       </p:grpSpPr>
+      <p:grpSp>
+        <p:nvGrpSpPr>
+          <p:cNvPr id="23" name="Group 22"/>
+          <p:cNvGrpSpPr/>
+          <p:nvPr/>
+        </p:nvGrpSpPr>
+        <p:grpSpPr>
+          <a:xfrm>
+            <a:off x="1803513" y="476250"/>
+            <a:ext cx="3759087" cy="2455961"/>
+            <a:chOff x="1803513" y="476250"/>
+            <a:chExt cx="3759087" cy="2455961"/>
+          </a:xfrm>
+        </p:grpSpPr>
+        <mc:AlternateContent xmlns:mc="http://schemas.openxmlformats.org/markup-compatibility/2006">
+          <mc:Choice xmlns:a14="http://schemas.microsoft.com/office/drawing/2010/main" Requires="a14">
+            <p:sp>
+              <p:nvSpPr>
+                <p:cNvPr id="7" name="TextBox 6"/>
+                <p:cNvSpPr txBox="1"/>
+                <p:nvPr/>
+              </p:nvSpPr>
+              <p:spPr>
+                <a:xfrm>
+                  <a:off x="2290521" y="476250"/>
+                  <a:ext cx="1252779" cy="307777"/>
+                </a:xfrm>
+                <a:prstGeom prst="rect">
+                  <a:avLst/>
+                </a:prstGeom>
+                <a:noFill/>
+              </p:spPr>
+              <p:txBody>
+                <a:bodyPr wrap="none" lIns="0" tIns="0" rIns="0" bIns="0" rtlCol="0">
+                  <a:spAutoFit/>
+                </a:bodyPr>
+                <a:lstStyle/>
+                <a:p>
+                  <a14:m>
+                    <m:oMathPara xmlns:m="http://schemas.openxmlformats.org/officeDocument/2006/math">
+                      <m:oMathParaPr>
+                        <m:jc m:val="centerGroup"/>
+                      </m:oMathParaPr>
+                      <m:oMath xmlns:m="http://schemas.openxmlformats.org/officeDocument/2006/math">
+                        <m:r>
+                          <a:rPr lang="en-US" sz="2000" b="0" i="1" smtClean="0">
+                            <a:latin typeface="Cambria Math" panose="02040503050406030204" pitchFamily="18" charset="0"/>
+                            <a:cs typeface="Arial" panose="020B0604020202020204" pitchFamily="34" charset="0"/>
+                          </a:rPr>
+                          <m:t>𝑐𝑜𝑛𝑑𝑢𝑐𝑡𝑜𝑟</m:t>
+                        </m:r>
+                      </m:oMath>
+                    </m:oMathPara>
+                  </a14:m>
+                  <a:endParaRPr lang="en-US" sz="2000" dirty="0" smtClean="0">
+                    <a:latin typeface="Arial" panose="020B0604020202020204" pitchFamily="34" charset="0"/>
+                    <a:cs typeface="Arial" panose="020B0604020202020204" pitchFamily="34" charset="0"/>
+                  </a:endParaRPr>
+                </a:p>
+              </p:txBody>
+            </p:sp>
+          </mc:Choice>
+          <mc:Fallback>
+            <p:sp>
+              <p:nvSpPr>
+                <p:cNvPr id="7" name="TextBox 6"/>
+                <p:cNvSpPr txBox="1">
+                  <a:spLocks noRot="1" noChangeAspect="1" noMove="1" noResize="1" noEditPoints="1" noAdjustHandles="1" noChangeArrowheads="1" noChangeShapeType="1" noTextEdit="1"/>
+                </p:cNvSpPr>
+                <p:nvPr/>
+              </p:nvSpPr>
+              <p:spPr>
+                <a:xfrm>
+                  <a:off x="2290521" y="476250"/>
+                  <a:ext cx="1252779" cy="307777"/>
+                </a:xfrm>
+                <a:prstGeom prst="rect">
+                  <a:avLst/>
+                </a:prstGeom>
+                <a:blipFill>
+                  <a:blip r:embed="rId2"/>
+                  <a:stretch>
+                    <a:fillRect l="-3902" r="-3902" b="-9804"/>
+                  </a:stretch>
+                </a:blipFill>
+              </p:spPr>
+              <p:txBody>
+                <a:bodyPr/>
+                <a:lstStyle/>
+                <a:p>
+                  <a:r>
+                    <a:rPr lang="en-US">
+                      <a:noFill/>
+                    </a:rPr>
+                    <a:t> </a:t>
+                  </a:r>
+                </a:p>
+              </p:txBody>
+            </p:sp>
+          </mc:Fallback>
+        </mc:AlternateContent>
+        <p:grpSp>
+          <p:nvGrpSpPr>
+            <p:cNvPr id="22" name="Group 21"/>
+            <p:cNvGrpSpPr/>
+            <p:nvPr/>
+          </p:nvGrpSpPr>
+          <p:grpSpPr>
+            <a:xfrm>
+              <a:off x="1803513" y="781050"/>
+              <a:ext cx="3759087" cy="2151161"/>
+              <a:chOff x="1803513" y="781050"/>
+              <a:chExt cx="3759087" cy="2151161"/>
+            </a:xfrm>
+          </p:grpSpPr>
+          <p:sp>
+            <p:nvSpPr>
+              <p:cNvPr id="4" name="Rectangle 3"/>
+              <p:cNvSpPr/>
+              <p:nvPr/>
+            </p:nvSpPr>
+            <p:spPr>
+              <a:xfrm>
+                <a:off x="2247900" y="1047750"/>
+                <a:ext cx="171450" cy="1466850"/>
+              </a:xfrm>
+              <a:prstGeom prst="rect">
+                <a:avLst/>
+              </a:prstGeom>
+              <a:noFill/>
+              <a:ln w="38100">
+                <a:solidFill>
+                  <a:schemeClr val="tx1"/>
+                </a:solidFill>
+              </a:ln>
+            </p:spPr>
+            <p:style>
+              <a:lnRef idx="2">
+                <a:schemeClr val="accent1">
+                  <a:shade val="50000"/>
+                </a:schemeClr>
+              </a:lnRef>
+              <a:fillRef idx="1">
+                <a:schemeClr val="accent1"/>
+              </a:fillRef>
+              <a:effectRef idx="0">
+                <a:schemeClr val="accent1"/>
+              </a:effectRef>
+              <a:fontRef idx="minor">
+                <a:schemeClr val="lt1"/>
+              </a:fontRef>
+            </p:style>
+            <p:txBody>
+              <a:bodyPr rtlCol="0" anchor="ctr"/>
+              <a:lstStyle/>
+              <a:p>
+                <a:pPr algn="ctr"/>
+                <a:endParaRPr lang="en-US"/>
+              </a:p>
+            </p:txBody>
+          </p:sp>
+          <p:sp>
+            <p:nvSpPr>
+              <p:cNvPr id="5" name="Rectangle 4"/>
+              <p:cNvSpPr/>
+              <p:nvPr/>
+            </p:nvSpPr>
+            <p:spPr>
+              <a:xfrm>
+                <a:off x="3390900" y="1047750"/>
+                <a:ext cx="171450" cy="1466850"/>
+              </a:xfrm>
+              <a:prstGeom prst="rect">
+                <a:avLst/>
+              </a:prstGeom>
+              <a:noFill/>
+              <a:ln w="38100">
+                <a:solidFill>
+                  <a:schemeClr val="tx1"/>
+                </a:solidFill>
+              </a:ln>
+            </p:spPr>
+            <p:style>
+              <a:lnRef idx="2">
+                <a:schemeClr val="accent1">
+                  <a:shade val="50000"/>
+                </a:schemeClr>
+              </a:lnRef>
+              <a:fillRef idx="1">
+                <a:schemeClr val="accent1"/>
+              </a:fillRef>
+              <a:effectRef idx="0">
+                <a:schemeClr val="accent1"/>
+              </a:effectRef>
+              <a:fontRef idx="minor">
+                <a:schemeClr val="lt1"/>
+              </a:fontRef>
+            </p:style>
+            <p:txBody>
+              <a:bodyPr rtlCol="0" anchor="ctr"/>
+              <a:lstStyle/>
+              <a:p>
+                <a:pPr algn="ctr"/>
+                <a:endParaRPr lang="en-US"/>
+              </a:p>
+            </p:txBody>
+          </p:sp>
+          <p:sp>
+            <p:nvSpPr>
+              <p:cNvPr id="6" name="Rectangle 5"/>
+              <p:cNvSpPr/>
+              <p:nvPr/>
+            </p:nvSpPr>
+            <p:spPr>
+              <a:xfrm>
+                <a:off x="2438400" y="1047751"/>
+                <a:ext cx="942975" cy="1466850"/>
+              </a:xfrm>
+              <a:prstGeom prst="rect">
+                <a:avLst/>
+              </a:prstGeom>
+              <a:solidFill>
+                <a:schemeClr val="bg2">
+                  <a:lumMod val="90000"/>
+                </a:schemeClr>
+              </a:solidFill>
+              <a:ln w="38100">
+                <a:noFill/>
+              </a:ln>
+            </p:spPr>
+            <p:style>
+              <a:lnRef idx="2">
+                <a:schemeClr val="accent1">
+                  <a:shade val="50000"/>
+                </a:schemeClr>
+              </a:lnRef>
+              <a:fillRef idx="1">
+                <a:schemeClr val="accent1"/>
+              </a:fillRef>
+              <a:effectRef idx="0">
+                <a:schemeClr val="accent1"/>
+              </a:effectRef>
+              <a:fontRef idx="minor">
+                <a:schemeClr val="lt1"/>
+              </a:fontRef>
+            </p:style>
+            <p:txBody>
+              <a:bodyPr rtlCol="0" anchor="ctr"/>
+              <a:lstStyle/>
+              <a:p>
+                <a:pPr algn="ctr"/>
+                <a:endParaRPr lang="en-US"/>
+              </a:p>
+            </p:txBody>
+          </p:sp>
+          <p:cxnSp>
+            <p:nvCxnSpPr>
+              <p:cNvPr id="9" name="Straight Arrow Connector 8"/>
+              <p:cNvCxnSpPr>
+                <a:endCxn id="4" idx="0"/>
+              </p:cNvCxnSpPr>
+              <p:nvPr/>
+            </p:nvCxnSpPr>
+            <p:spPr>
+              <a:xfrm flipH="1">
+                <a:off x="2333625" y="781050"/>
+                <a:ext cx="266700" cy="266700"/>
+              </a:xfrm>
+              <a:prstGeom prst="straightConnector1">
+                <a:avLst/>
+              </a:prstGeom>
+              <a:ln w="38100">
+                <a:solidFill>
+                  <a:schemeClr val="tx1"/>
+                </a:solidFill>
+                <a:tailEnd type="triangle"/>
+              </a:ln>
+            </p:spPr>
+            <p:style>
+              <a:lnRef idx="1">
+                <a:schemeClr val="accent1"/>
+              </a:lnRef>
+              <a:fillRef idx="0">
+                <a:schemeClr val="accent1"/>
+              </a:fillRef>
+              <a:effectRef idx="0">
+                <a:schemeClr val="accent1"/>
+              </a:effectRef>
+              <a:fontRef idx="minor">
+                <a:schemeClr val="tx1"/>
+              </a:fontRef>
+            </p:style>
+          </p:cxnSp>
+          <p:cxnSp>
+            <p:nvCxnSpPr>
+              <p:cNvPr id="10" name="Straight Arrow Connector 9"/>
+              <p:cNvCxnSpPr>
+                <a:endCxn id="5" idx="0"/>
+              </p:cNvCxnSpPr>
+              <p:nvPr/>
+            </p:nvCxnSpPr>
+            <p:spPr>
+              <a:xfrm>
+                <a:off x="3209925" y="781050"/>
+                <a:ext cx="266700" cy="266700"/>
+              </a:xfrm>
+              <a:prstGeom prst="straightConnector1">
+                <a:avLst/>
+              </a:prstGeom>
+              <a:ln w="38100">
+                <a:solidFill>
+                  <a:schemeClr val="tx1"/>
+                </a:solidFill>
+                <a:tailEnd type="triangle"/>
+              </a:ln>
+            </p:spPr>
+            <p:style>
+              <a:lnRef idx="1">
+                <a:schemeClr val="accent1"/>
+              </a:lnRef>
+              <a:fillRef idx="0">
+                <a:schemeClr val="accent1"/>
+              </a:fillRef>
+              <a:effectRef idx="0">
+                <a:schemeClr val="accent1"/>
+              </a:effectRef>
+              <a:fontRef idx="minor">
+                <a:schemeClr val="tx1"/>
+              </a:fontRef>
+            </p:style>
+          </p:cxnSp>
+          <mc:AlternateContent xmlns:mc="http://schemas.openxmlformats.org/markup-compatibility/2006">
+            <mc:Choice xmlns:a14="http://schemas.microsoft.com/office/drawing/2010/main" Requires="a14">
+              <p:sp>
+                <p:nvSpPr>
+                  <p:cNvPr id="13" name="TextBox 12"/>
+                  <p:cNvSpPr txBox="1"/>
+                  <p:nvPr/>
+                </p:nvSpPr>
+                <p:spPr>
+                  <a:xfrm>
+                    <a:off x="2100949" y="2624434"/>
+                    <a:ext cx="1631922" cy="307777"/>
+                  </a:xfrm>
+                  <a:prstGeom prst="rect">
+                    <a:avLst/>
+                  </a:prstGeom>
+                  <a:noFill/>
+                </p:spPr>
+                <p:txBody>
+                  <a:bodyPr wrap="none" lIns="0" tIns="0" rIns="0" bIns="0" rtlCol="0">
+                    <a:spAutoFit/>
+                  </a:bodyPr>
+                  <a:lstStyle/>
+                  <a:p>
+                    <a14:m>
+                      <m:oMathPara xmlns:m="http://schemas.openxmlformats.org/officeDocument/2006/math">
+                        <m:oMathParaPr>
+                          <m:jc m:val="centerGroup"/>
+                        </m:oMathParaPr>
+                        <m:oMath xmlns:m="http://schemas.openxmlformats.org/officeDocument/2006/math">
+                          <m:r>
+                            <a:rPr lang="en-US" sz="2000" b="0" i="1" smtClean="0">
+                              <a:latin typeface="Cambria Math" panose="02040503050406030204" pitchFamily="18" charset="0"/>
+                              <a:cs typeface="Arial" panose="020B0604020202020204" pitchFamily="34" charset="0"/>
+                            </a:rPr>
+                            <m:t>𝑖𝑛𝑠𝑢𝑙𝑎𝑡𝑜𝑟</m:t>
+                          </m:r>
+                          <m:r>
+                            <a:rPr lang="en-US" sz="2000" b="0" i="1" smtClean="0">
+                              <a:latin typeface="Cambria Math" panose="02040503050406030204" pitchFamily="18" charset="0"/>
+                              <a:cs typeface="Arial" panose="020B0604020202020204" pitchFamily="34" charset="0"/>
+                            </a:rPr>
+                            <m:t>/</m:t>
+                          </m:r>
+                          <m:r>
+                            <a:rPr lang="en-US" sz="2000" b="0" i="1" smtClean="0">
+                              <a:latin typeface="Cambria Math" panose="02040503050406030204" pitchFamily="18" charset="0"/>
+                              <a:cs typeface="Arial" panose="020B0604020202020204" pitchFamily="34" charset="0"/>
+                            </a:rPr>
+                            <m:t>𝑎𝑖𝑟</m:t>
+                          </m:r>
+                        </m:oMath>
+                      </m:oMathPara>
+                    </a14:m>
+                    <a:endParaRPr lang="en-US" sz="2000" dirty="0" smtClean="0">
+                      <a:latin typeface="Arial" panose="020B0604020202020204" pitchFamily="34" charset="0"/>
+                      <a:cs typeface="Arial" panose="020B0604020202020204" pitchFamily="34" charset="0"/>
+                    </a:endParaRPr>
+                  </a:p>
+                </p:txBody>
+              </p:sp>
+            </mc:Choice>
+            <mc:Fallback>
+              <p:sp>
+                <p:nvSpPr>
+                  <p:cNvPr id="13" name="TextBox 12"/>
+                  <p:cNvSpPr txBox="1">
+                    <a:spLocks noRot="1" noChangeAspect="1" noMove="1" noResize="1" noEditPoints="1" noAdjustHandles="1" noChangeArrowheads="1" noChangeShapeType="1" noTextEdit="1"/>
+                  </p:cNvSpPr>
+                  <p:nvPr/>
+                </p:nvSpPr>
+                <p:spPr>
+                  <a:xfrm>
+                    <a:off x="2100949" y="2624434"/>
+                    <a:ext cx="1631922" cy="307777"/>
+                  </a:xfrm>
+                  <a:prstGeom prst="rect">
+                    <a:avLst/>
+                  </a:prstGeom>
+                  <a:blipFill>
+                    <a:blip r:embed="rId3"/>
+                    <a:stretch>
+                      <a:fillRect l="-2996" r="-2622" b="-38000"/>
+                    </a:stretch>
+                  </a:blipFill>
+                </p:spPr>
+                <p:txBody>
+                  <a:bodyPr/>
+                  <a:lstStyle/>
+                  <a:p>
+                    <a:r>
+                      <a:rPr lang="en-US">
+                        <a:noFill/>
+                      </a:rPr>
+                      <a:t> </a:t>
+                    </a:r>
+                  </a:p>
+                </p:txBody>
+              </p:sp>
+            </mc:Fallback>
+          </mc:AlternateContent>
+          <p:cxnSp>
+            <p:nvCxnSpPr>
+              <p:cNvPr id="14" name="Straight Arrow Connector 13"/>
+              <p:cNvCxnSpPr>
+                <a:stCxn id="13" idx="0"/>
+              </p:cNvCxnSpPr>
+              <p:nvPr/>
+            </p:nvCxnSpPr>
+            <p:spPr>
+              <a:xfrm flipV="1">
+                <a:off x="2916910" y="2181226"/>
+                <a:ext cx="0" cy="443208"/>
+              </a:xfrm>
+              <a:prstGeom prst="straightConnector1">
+                <a:avLst/>
+              </a:prstGeom>
+              <a:ln w="38100">
+                <a:solidFill>
+                  <a:schemeClr val="tx1"/>
+                </a:solidFill>
+                <a:tailEnd type="triangle"/>
+              </a:ln>
+            </p:spPr>
+            <p:style>
+              <a:lnRef idx="1">
+                <a:schemeClr val="accent1"/>
+              </a:lnRef>
+              <a:fillRef idx="0">
+                <a:schemeClr val="accent1"/>
+              </a:fillRef>
+              <a:effectRef idx="0">
+                <a:schemeClr val="accent1"/>
+              </a:effectRef>
+              <a:fontRef idx="minor">
+                <a:schemeClr val="tx1"/>
+              </a:fontRef>
+            </p:style>
+          </p:cxnSp>
+          <p:sp>
+            <p:nvSpPr>
+              <p:cNvPr id="17" name="TextBox 16"/>
+              <p:cNvSpPr txBox="1"/>
+              <p:nvPr/>
+            </p:nvSpPr>
+            <p:spPr>
+              <a:xfrm>
+                <a:off x="2172830" y="993218"/>
+                <a:ext cx="323850" cy="1631216"/>
+              </a:xfrm>
+              <a:prstGeom prst="rect">
+                <a:avLst/>
+              </a:prstGeom>
+              <a:noFill/>
+            </p:spPr>
+            <p:txBody>
+              <a:bodyPr wrap="square" rtlCol="0">
+                <a:spAutoFit/>
+              </a:bodyPr>
+              <a:lstStyle/>
+              <a:p>
+                <a:r>
+                  <a:rPr lang="en-US" sz="2000" dirty="0" smtClean="0">
+                    <a:latin typeface="Arial" panose="020B0604020202020204" pitchFamily="34" charset="0"/>
+                    <a:cs typeface="Arial" panose="020B0604020202020204" pitchFamily="34" charset="0"/>
+                  </a:rPr>
+                  <a:t>+</a:t>
+                </a:r>
+              </a:p>
+              <a:p>
+                <a:r>
+                  <a:rPr lang="en-US" sz="2000" dirty="0" smtClean="0">
+                    <a:latin typeface="Arial" panose="020B0604020202020204" pitchFamily="34" charset="0"/>
+                    <a:cs typeface="Arial" panose="020B0604020202020204" pitchFamily="34" charset="0"/>
+                  </a:rPr>
+                  <a:t>+</a:t>
+                </a:r>
+              </a:p>
+              <a:p>
+                <a:r>
+                  <a:rPr lang="en-US" sz="2000" dirty="0" smtClean="0">
+                    <a:latin typeface="Arial" panose="020B0604020202020204" pitchFamily="34" charset="0"/>
+                    <a:cs typeface="Arial" panose="020B0604020202020204" pitchFamily="34" charset="0"/>
+                  </a:rPr>
+                  <a:t>+</a:t>
+                </a:r>
+              </a:p>
+              <a:p>
+                <a:r>
+                  <a:rPr lang="en-US" sz="2000" dirty="0" smtClean="0">
+                    <a:latin typeface="Arial" panose="020B0604020202020204" pitchFamily="34" charset="0"/>
+                    <a:cs typeface="Arial" panose="020B0604020202020204" pitchFamily="34" charset="0"/>
+                  </a:rPr>
+                  <a:t>+</a:t>
+                </a:r>
+              </a:p>
+              <a:p>
+                <a:r>
+                  <a:rPr lang="en-US" sz="2000" dirty="0">
+                    <a:latin typeface="Arial" panose="020B0604020202020204" pitchFamily="34" charset="0"/>
+                    <a:cs typeface="Arial" panose="020B0604020202020204" pitchFamily="34" charset="0"/>
+                  </a:rPr>
+                  <a:t>+</a:t>
+                </a:r>
+                <a:endParaRPr lang="en-US" sz="2000" dirty="0" smtClean="0">
+                  <a:latin typeface="Arial" panose="020B0604020202020204" pitchFamily="34" charset="0"/>
+                  <a:cs typeface="Arial" panose="020B0604020202020204" pitchFamily="34" charset="0"/>
+                </a:endParaRPr>
+              </a:p>
+            </p:txBody>
+          </p:sp>
+          <p:sp>
+            <p:nvSpPr>
+              <p:cNvPr id="18" name="TextBox 17"/>
+              <p:cNvSpPr txBox="1"/>
+              <p:nvPr/>
+            </p:nvSpPr>
+            <p:spPr>
+              <a:xfrm>
+                <a:off x="3337383" y="974168"/>
+                <a:ext cx="323850" cy="1631216"/>
+              </a:xfrm>
+              <a:prstGeom prst="rect">
+                <a:avLst/>
+              </a:prstGeom>
+              <a:noFill/>
+            </p:spPr>
+            <p:txBody>
+              <a:bodyPr wrap="square" rtlCol="0">
+                <a:spAutoFit/>
+              </a:bodyPr>
+              <a:lstStyle/>
+              <a:p>
+                <a:r>
+                  <a:rPr lang="en-US" sz="2000" dirty="0" smtClean="0">
+                    <a:latin typeface="Arial" panose="020B0604020202020204" pitchFamily="34" charset="0"/>
+                    <a:cs typeface="Arial" panose="020B0604020202020204" pitchFamily="34" charset="0"/>
+                  </a:rPr>
+                  <a:t>-</a:t>
+                </a:r>
+              </a:p>
+              <a:p>
+                <a:r>
+                  <a:rPr lang="en-US" sz="2000" dirty="0" smtClean="0">
+                    <a:latin typeface="Arial" panose="020B0604020202020204" pitchFamily="34" charset="0"/>
+                    <a:cs typeface="Arial" panose="020B0604020202020204" pitchFamily="34" charset="0"/>
+                  </a:rPr>
+                  <a:t>-</a:t>
+                </a:r>
+              </a:p>
+              <a:p>
+                <a:r>
+                  <a:rPr lang="en-US" sz="2000" dirty="0" smtClean="0">
+                    <a:latin typeface="Arial" panose="020B0604020202020204" pitchFamily="34" charset="0"/>
+                    <a:cs typeface="Arial" panose="020B0604020202020204" pitchFamily="34" charset="0"/>
+                  </a:rPr>
+                  <a:t>-</a:t>
+                </a:r>
+              </a:p>
+              <a:p>
+                <a:r>
+                  <a:rPr lang="en-US" sz="2000" dirty="0" smtClean="0">
+                    <a:latin typeface="Arial" panose="020B0604020202020204" pitchFamily="34" charset="0"/>
+                    <a:cs typeface="Arial" panose="020B0604020202020204" pitchFamily="34" charset="0"/>
+                  </a:rPr>
+                  <a:t>-</a:t>
+                </a:r>
+              </a:p>
+              <a:p>
+                <a:r>
+                  <a:rPr lang="en-US" sz="2000" dirty="0" smtClean="0">
+                    <a:latin typeface="Arial" panose="020B0604020202020204" pitchFamily="34" charset="0"/>
+                    <a:cs typeface="Arial" panose="020B0604020202020204" pitchFamily="34" charset="0"/>
+                  </a:rPr>
+                  <a:t>-</a:t>
+                </a:r>
+                <a:endParaRPr lang="en-US" sz="2000" dirty="0" smtClean="0">
+                  <a:latin typeface="Arial" panose="020B0604020202020204" pitchFamily="34" charset="0"/>
+                  <a:cs typeface="Arial" panose="020B0604020202020204" pitchFamily="34" charset="0"/>
+                </a:endParaRPr>
+              </a:p>
+            </p:txBody>
+          </p:sp>
+          <mc:AlternateContent xmlns:mc="http://schemas.openxmlformats.org/markup-compatibility/2006">
+            <mc:Choice xmlns:a14="http://schemas.microsoft.com/office/drawing/2010/main" Requires="a14">
+              <p:sp>
+                <p:nvSpPr>
+                  <p:cNvPr id="19" name="TextBox 18"/>
+                  <p:cNvSpPr txBox="1"/>
+                  <p:nvPr/>
+                </p:nvSpPr>
+                <p:spPr>
+                  <a:xfrm>
+                    <a:off x="1803513" y="1528315"/>
+                    <a:ext cx="443519" cy="307777"/>
+                  </a:xfrm>
+                  <a:prstGeom prst="rect">
+                    <a:avLst/>
+                  </a:prstGeom>
+                  <a:noFill/>
+                </p:spPr>
+                <p:txBody>
+                  <a:bodyPr wrap="none" lIns="0" tIns="0" rIns="0" bIns="0" rtlCol="0">
+                    <a:spAutoFit/>
+                  </a:bodyPr>
+                  <a:lstStyle/>
+                  <a:p>
+                    <a14:m>
+                      <m:oMathPara xmlns:m="http://schemas.openxmlformats.org/officeDocument/2006/math">
+                        <m:oMathParaPr>
+                          <m:jc m:val="centerGroup"/>
+                        </m:oMathParaPr>
+                        <m:oMath xmlns:m="http://schemas.openxmlformats.org/officeDocument/2006/math">
+                          <m:r>
+                            <a:rPr lang="en-US" sz="2000" b="0" i="1" smtClean="0">
+                              <a:latin typeface="Cambria Math" panose="02040503050406030204" pitchFamily="18" charset="0"/>
+                              <a:cs typeface="Arial" panose="020B0604020202020204" pitchFamily="34" charset="0"/>
+                            </a:rPr>
+                            <m:t>+</m:t>
+                          </m:r>
+                          <m:r>
+                            <a:rPr lang="en-US" sz="2000" b="0" i="1" smtClean="0">
+                              <a:latin typeface="Cambria Math" panose="02040503050406030204" pitchFamily="18" charset="0"/>
+                              <a:cs typeface="Arial" panose="020B0604020202020204" pitchFamily="34" charset="0"/>
+                            </a:rPr>
+                            <m:t>𝑄</m:t>
+                          </m:r>
+                        </m:oMath>
+                      </m:oMathPara>
+                    </a14:m>
+                    <a:endParaRPr lang="en-US" sz="2000" dirty="0" smtClean="0">
+                      <a:latin typeface="Arial" panose="020B0604020202020204" pitchFamily="34" charset="0"/>
+                      <a:cs typeface="Arial" panose="020B0604020202020204" pitchFamily="34" charset="0"/>
+                    </a:endParaRPr>
+                  </a:p>
+                </p:txBody>
+              </p:sp>
+            </mc:Choice>
+            <mc:Fallback>
+              <p:sp>
+                <p:nvSpPr>
+                  <p:cNvPr id="19" name="TextBox 18"/>
+                  <p:cNvSpPr txBox="1">
+                    <a:spLocks noRot="1" noChangeAspect="1" noMove="1" noResize="1" noEditPoints="1" noAdjustHandles="1" noChangeArrowheads="1" noChangeShapeType="1" noTextEdit="1"/>
+                  </p:cNvSpPr>
+                  <p:nvPr/>
+                </p:nvSpPr>
+                <p:spPr>
+                  <a:xfrm>
+                    <a:off x="1803513" y="1528315"/>
+                    <a:ext cx="443519" cy="307777"/>
+                  </a:xfrm>
+                  <a:prstGeom prst="rect">
+                    <a:avLst/>
+                  </a:prstGeom>
+                  <a:blipFill>
+                    <a:blip r:embed="rId4"/>
+                    <a:stretch>
+                      <a:fillRect l="-10959" r="-13699" b="-32000"/>
+                    </a:stretch>
+                  </a:blipFill>
+                </p:spPr>
+                <p:txBody>
+                  <a:bodyPr/>
+                  <a:lstStyle/>
+                  <a:p>
+                    <a:r>
+                      <a:rPr lang="en-US">
+                        <a:noFill/>
+                      </a:rPr>
+                      <a:t> </a:t>
+                    </a:r>
+                  </a:p>
+                </p:txBody>
+              </p:sp>
+            </mc:Fallback>
+          </mc:AlternateContent>
+          <mc:AlternateContent xmlns:mc="http://schemas.openxmlformats.org/markup-compatibility/2006">
+            <mc:Choice xmlns:a14="http://schemas.microsoft.com/office/drawing/2010/main" Requires="a14">
+              <p:sp>
+                <p:nvSpPr>
+                  <p:cNvPr id="20" name="TextBox 19"/>
+                  <p:cNvSpPr txBox="1"/>
+                  <p:nvPr/>
+                </p:nvSpPr>
+                <p:spPr>
+                  <a:xfrm>
+                    <a:off x="3546457" y="1574526"/>
+                    <a:ext cx="443519" cy="307777"/>
+                  </a:xfrm>
+                  <a:prstGeom prst="rect">
+                    <a:avLst/>
+                  </a:prstGeom>
+                  <a:noFill/>
+                </p:spPr>
+                <p:txBody>
+                  <a:bodyPr wrap="none" lIns="0" tIns="0" rIns="0" bIns="0" rtlCol="0">
+                    <a:spAutoFit/>
+                  </a:bodyPr>
+                  <a:lstStyle/>
+                  <a:p>
+                    <a14:m>
+                      <m:oMathPara xmlns:m="http://schemas.openxmlformats.org/officeDocument/2006/math">
+                        <m:oMathParaPr>
+                          <m:jc m:val="centerGroup"/>
+                        </m:oMathParaPr>
+                        <m:oMath xmlns:m="http://schemas.openxmlformats.org/officeDocument/2006/math">
+                          <m:r>
+                            <a:rPr lang="en-US" sz="2000" b="0" i="1" smtClean="0">
+                              <a:latin typeface="Cambria Math" panose="02040503050406030204" pitchFamily="18" charset="0"/>
+                              <a:cs typeface="Arial" panose="020B0604020202020204" pitchFamily="34" charset="0"/>
+                            </a:rPr>
+                            <m:t>−</m:t>
+                          </m:r>
+                          <m:r>
+                            <a:rPr lang="en-US" sz="2000" b="0" i="1" smtClean="0">
+                              <a:latin typeface="Cambria Math" panose="02040503050406030204" pitchFamily="18" charset="0"/>
+                              <a:cs typeface="Arial" panose="020B0604020202020204" pitchFamily="34" charset="0"/>
+                            </a:rPr>
+                            <m:t>𝑄</m:t>
+                          </m:r>
+                        </m:oMath>
+                      </m:oMathPara>
+                    </a14:m>
+                    <a:endParaRPr lang="en-US" sz="2000" dirty="0" smtClean="0">
+                      <a:latin typeface="Arial" panose="020B0604020202020204" pitchFamily="34" charset="0"/>
+                      <a:cs typeface="Arial" panose="020B0604020202020204" pitchFamily="34" charset="0"/>
+                    </a:endParaRPr>
+                  </a:p>
+                </p:txBody>
+              </p:sp>
+            </mc:Choice>
+            <mc:Fallback>
+              <p:sp>
+                <p:nvSpPr>
+                  <p:cNvPr id="20" name="TextBox 19"/>
+                  <p:cNvSpPr txBox="1">
+                    <a:spLocks noRot="1" noChangeAspect="1" noMove="1" noResize="1" noEditPoints="1" noAdjustHandles="1" noChangeArrowheads="1" noChangeShapeType="1" noTextEdit="1"/>
+                  </p:cNvSpPr>
+                  <p:nvPr/>
+                </p:nvSpPr>
+                <p:spPr>
+                  <a:xfrm>
+                    <a:off x="3546457" y="1574526"/>
+                    <a:ext cx="443519" cy="307777"/>
+                  </a:xfrm>
+                  <a:prstGeom prst="rect">
+                    <a:avLst/>
+                  </a:prstGeom>
+                  <a:blipFill>
+                    <a:blip r:embed="rId5"/>
+                    <a:stretch>
+                      <a:fillRect l="-2740" r="-13699" b="-29412"/>
+                    </a:stretch>
+                  </a:blipFill>
+                </p:spPr>
+                <p:txBody>
+                  <a:bodyPr/>
+                  <a:lstStyle/>
+                  <a:p>
+                    <a:r>
+                      <a:rPr lang="en-US">
+                        <a:noFill/>
+                      </a:rPr>
+                      <a:t> </a:t>
+                    </a:r>
+                  </a:p>
+                </p:txBody>
+              </p:sp>
+            </mc:Fallback>
+          </mc:AlternateContent>
+          <p:sp>
+            <p:nvSpPr>
+              <p:cNvPr id="21" name="Freeform 20"/>
+              <p:cNvSpPr/>
+              <p:nvPr/>
+            </p:nvSpPr>
+            <p:spPr>
+              <a:xfrm>
+                <a:off x="4591050" y="1257300"/>
+                <a:ext cx="971550" cy="1047750"/>
+              </a:xfrm>
+              <a:custGeom>
+                <a:avLst/>
+                <a:gdLst>
+                  <a:gd name="connsiteX0" fmla="*/ 390525 w 971550"/>
+                  <a:gd name="connsiteY0" fmla="*/ 628650 h 1047750"/>
+                  <a:gd name="connsiteX1" fmla="*/ 533400 w 971550"/>
+                  <a:gd name="connsiteY1" fmla="*/ 552450 h 1047750"/>
+                  <a:gd name="connsiteX2" fmla="*/ 552450 w 971550"/>
+                  <a:gd name="connsiteY2" fmla="*/ 695325 h 1047750"/>
+                  <a:gd name="connsiteX3" fmla="*/ 390525 w 971550"/>
+                  <a:gd name="connsiteY3" fmla="*/ 809625 h 1047750"/>
+                  <a:gd name="connsiteX4" fmla="*/ 285750 w 971550"/>
+                  <a:gd name="connsiteY4" fmla="*/ 676275 h 1047750"/>
+                  <a:gd name="connsiteX5" fmla="*/ 304800 w 971550"/>
+                  <a:gd name="connsiteY5" fmla="*/ 390525 h 1047750"/>
+                  <a:gd name="connsiteX6" fmla="*/ 628650 w 971550"/>
+                  <a:gd name="connsiteY6" fmla="*/ 371475 h 1047750"/>
+                  <a:gd name="connsiteX7" fmla="*/ 752475 w 971550"/>
+                  <a:gd name="connsiteY7" fmla="*/ 571500 h 1047750"/>
+                  <a:gd name="connsiteX8" fmla="*/ 638175 w 971550"/>
+                  <a:gd name="connsiteY8" fmla="*/ 847725 h 1047750"/>
+                  <a:gd name="connsiteX9" fmla="*/ 323850 w 971550"/>
+                  <a:gd name="connsiteY9" fmla="*/ 942975 h 1047750"/>
+                  <a:gd name="connsiteX10" fmla="*/ 104775 w 971550"/>
+                  <a:gd name="connsiteY10" fmla="*/ 695325 h 1047750"/>
+                  <a:gd name="connsiteX11" fmla="*/ 161925 w 971550"/>
+                  <a:gd name="connsiteY11" fmla="*/ 247650 h 1047750"/>
+                  <a:gd name="connsiteX12" fmla="*/ 676275 w 971550"/>
+                  <a:gd name="connsiteY12" fmla="*/ 133350 h 1047750"/>
+                  <a:gd name="connsiteX13" fmla="*/ 914400 w 971550"/>
+                  <a:gd name="connsiteY13" fmla="*/ 371475 h 1047750"/>
+                  <a:gd name="connsiteX14" fmla="*/ 971550 w 971550"/>
+                  <a:gd name="connsiteY14" fmla="*/ 266700 h 1047750"/>
+                  <a:gd name="connsiteX15" fmla="*/ 666750 w 971550"/>
+                  <a:gd name="connsiteY15" fmla="*/ 0 h 1047750"/>
+                  <a:gd name="connsiteX16" fmla="*/ 104775 w 971550"/>
+                  <a:gd name="connsiteY16" fmla="*/ 161925 h 1047750"/>
+                  <a:gd name="connsiteX17" fmla="*/ 0 w 971550"/>
+                  <a:gd name="connsiteY17" fmla="*/ 771525 h 1047750"/>
+                  <a:gd name="connsiteX18" fmla="*/ 276225 w 971550"/>
+                  <a:gd name="connsiteY18" fmla="*/ 1047750 h 1047750"/>
+                  <a:gd name="connsiteX19" fmla="*/ 695325 w 971550"/>
+                  <a:gd name="connsiteY19" fmla="*/ 942975 h 1047750"/>
+                  <a:gd name="connsiteX20" fmla="*/ 828675 w 971550"/>
+                  <a:gd name="connsiteY20" fmla="*/ 581025 h 1047750"/>
+                  <a:gd name="connsiteX21" fmla="*/ 685800 w 971550"/>
+                  <a:gd name="connsiteY21" fmla="*/ 323850 h 1047750"/>
+                  <a:gd name="connsiteX22" fmla="*/ 200025 w 971550"/>
+                  <a:gd name="connsiteY22" fmla="*/ 342900 h 1047750"/>
+                  <a:gd name="connsiteX23" fmla="*/ 219075 w 971550"/>
+                  <a:gd name="connsiteY23" fmla="*/ 752475 h 1047750"/>
+                  <a:gd name="connsiteX24" fmla="*/ 371475 w 971550"/>
+                  <a:gd name="connsiteY24" fmla="*/ 866775 h 1047750"/>
+                  <a:gd name="connsiteX25" fmla="*/ 647700 w 971550"/>
+                  <a:gd name="connsiteY25" fmla="*/ 723900 h 1047750"/>
+                  <a:gd name="connsiteX26" fmla="*/ 619125 w 971550"/>
+                  <a:gd name="connsiteY26" fmla="*/ 504825 h 1047750"/>
+                  <a:gd name="connsiteX27" fmla="*/ 542925 w 971550"/>
+                  <a:gd name="connsiteY27" fmla="*/ 476250 h 1047750"/>
+                  <a:gd name="connsiteX28" fmla="*/ 381000 w 971550"/>
+                  <a:gd name="connsiteY28" fmla="*/ 542925 h 1047750"/>
+                  <a:gd name="connsiteX29" fmla="*/ 390525 w 971550"/>
+                  <a:gd name="connsiteY29" fmla="*/ 628650 h 1047750"/>
+                </a:gdLst>
+                <a:ahLst/>
+                <a:cxnLst>
+                  <a:cxn ang="0">
+                    <a:pos x="connsiteX0" y="connsiteY0"/>
+                  </a:cxn>
+                  <a:cxn ang="0">
+                    <a:pos x="connsiteX1" y="connsiteY1"/>
+                  </a:cxn>
+                  <a:cxn ang="0">
+                    <a:pos x="connsiteX2" y="connsiteY2"/>
+                  </a:cxn>
+                  <a:cxn ang="0">
+                    <a:pos x="connsiteX3" y="connsiteY3"/>
+                  </a:cxn>
+                  <a:cxn ang="0">
+                    <a:pos x="connsiteX4" y="connsiteY4"/>
+                  </a:cxn>
+                  <a:cxn ang="0">
+                    <a:pos x="connsiteX5" y="connsiteY5"/>
+                  </a:cxn>
+                  <a:cxn ang="0">
+                    <a:pos x="connsiteX6" y="connsiteY6"/>
+                  </a:cxn>
+                  <a:cxn ang="0">
+                    <a:pos x="connsiteX7" y="connsiteY7"/>
+                  </a:cxn>
+                  <a:cxn ang="0">
+                    <a:pos x="connsiteX8" y="connsiteY8"/>
+                  </a:cxn>
+                  <a:cxn ang="0">
+                    <a:pos x="connsiteX9" y="connsiteY9"/>
+                  </a:cxn>
+                  <a:cxn ang="0">
+                    <a:pos x="connsiteX10" y="connsiteY10"/>
+                  </a:cxn>
+                  <a:cxn ang="0">
+                    <a:pos x="connsiteX11" y="connsiteY11"/>
+                  </a:cxn>
+                  <a:cxn ang="0">
+                    <a:pos x="connsiteX12" y="connsiteY12"/>
+                  </a:cxn>
+                  <a:cxn ang="0">
+                    <a:pos x="connsiteX13" y="connsiteY13"/>
+                  </a:cxn>
+                  <a:cxn ang="0">
+                    <a:pos x="connsiteX14" y="connsiteY14"/>
+                  </a:cxn>
+                  <a:cxn ang="0">
+                    <a:pos x="connsiteX15" y="connsiteY15"/>
+                  </a:cxn>
+                  <a:cxn ang="0">
+                    <a:pos x="connsiteX16" y="connsiteY16"/>
+                  </a:cxn>
+                  <a:cxn ang="0">
+                    <a:pos x="connsiteX17" y="connsiteY17"/>
+                  </a:cxn>
+                  <a:cxn ang="0">
+                    <a:pos x="connsiteX18" y="connsiteY18"/>
+                  </a:cxn>
+                  <a:cxn ang="0">
+                    <a:pos x="connsiteX19" y="connsiteY19"/>
+                  </a:cxn>
+                  <a:cxn ang="0">
+                    <a:pos x="connsiteX20" y="connsiteY20"/>
+                  </a:cxn>
+                  <a:cxn ang="0">
+                    <a:pos x="connsiteX21" y="connsiteY21"/>
+                  </a:cxn>
+                  <a:cxn ang="0">
+                    <a:pos x="connsiteX22" y="connsiteY22"/>
+                  </a:cxn>
+                  <a:cxn ang="0">
+                    <a:pos x="connsiteX23" y="connsiteY23"/>
+                  </a:cxn>
+                  <a:cxn ang="0">
+                    <a:pos x="connsiteX24" y="connsiteY24"/>
+                  </a:cxn>
+                  <a:cxn ang="0">
+                    <a:pos x="connsiteX25" y="connsiteY25"/>
+                  </a:cxn>
+                  <a:cxn ang="0">
+                    <a:pos x="connsiteX26" y="connsiteY26"/>
+                  </a:cxn>
+                  <a:cxn ang="0">
+                    <a:pos x="connsiteX27" y="connsiteY27"/>
+                  </a:cxn>
+                  <a:cxn ang="0">
+                    <a:pos x="connsiteX28" y="connsiteY28"/>
+                  </a:cxn>
+                  <a:cxn ang="0">
+                    <a:pos x="connsiteX29" y="connsiteY29"/>
+                  </a:cxn>
+                </a:cxnLst>
+                <a:rect l="l" t="t" r="r" b="b"/>
+                <a:pathLst>
+                  <a:path w="971550" h="1047750">
+                    <a:moveTo>
+                      <a:pt x="390525" y="628650"/>
+                    </a:moveTo>
+                    <a:lnTo>
+                      <a:pt x="533400" y="552450"/>
+                    </a:lnTo>
+                    <a:lnTo>
+                      <a:pt x="552450" y="695325"/>
+                    </a:lnTo>
+                    <a:lnTo>
+                      <a:pt x="390525" y="809625"/>
+                    </a:lnTo>
+                    <a:lnTo>
+                      <a:pt x="285750" y="676275"/>
+                    </a:lnTo>
+                    <a:lnTo>
+                      <a:pt x="304800" y="390525"/>
+                    </a:lnTo>
+                    <a:lnTo>
+                      <a:pt x="628650" y="371475"/>
+                    </a:lnTo>
+                    <a:lnTo>
+                      <a:pt x="752475" y="571500"/>
+                    </a:lnTo>
+                    <a:lnTo>
+                      <a:pt x="638175" y="847725"/>
+                    </a:lnTo>
+                    <a:lnTo>
+                      <a:pt x="323850" y="942975"/>
+                    </a:lnTo>
+                    <a:lnTo>
+                      <a:pt x="104775" y="695325"/>
+                    </a:lnTo>
+                    <a:lnTo>
+                      <a:pt x="161925" y="247650"/>
+                    </a:lnTo>
+                    <a:lnTo>
+                      <a:pt x="676275" y="133350"/>
+                    </a:lnTo>
+                    <a:lnTo>
+                      <a:pt x="914400" y="371475"/>
+                    </a:lnTo>
+                    <a:lnTo>
+                      <a:pt x="971550" y="266700"/>
+                    </a:lnTo>
+                    <a:lnTo>
+                      <a:pt x="666750" y="0"/>
+                    </a:lnTo>
+                    <a:lnTo>
+                      <a:pt x="104775" y="161925"/>
+                    </a:lnTo>
+                    <a:lnTo>
+                      <a:pt x="0" y="771525"/>
+                    </a:lnTo>
+                    <a:lnTo>
+                      <a:pt x="276225" y="1047750"/>
+                    </a:lnTo>
+                    <a:lnTo>
+                      <a:pt x="695325" y="942975"/>
+                    </a:lnTo>
+                    <a:lnTo>
+                      <a:pt x="828675" y="581025"/>
+                    </a:lnTo>
+                    <a:lnTo>
+                      <a:pt x="685800" y="323850"/>
+                    </a:lnTo>
+                    <a:lnTo>
+                      <a:pt x="200025" y="342900"/>
+                    </a:lnTo>
+                    <a:lnTo>
+                      <a:pt x="219075" y="752475"/>
+                    </a:lnTo>
+                    <a:lnTo>
+                      <a:pt x="371475" y="866775"/>
+                    </a:lnTo>
+                    <a:lnTo>
+                      <a:pt x="647700" y="723900"/>
+                    </a:lnTo>
+                    <a:lnTo>
+                      <a:pt x="619125" y="504825"/>
+                    </a:lnTo>
+                    <a:lnTo>
+                      <a:pt x="542925" y="476250"/>
+                    </a:lnTo>
+                    <a:lnTo>
+                      <a:pt x="381000" y="542925"/>
+                    </a:lnTo>
+                    <a:lnTo>
+                      <a:pt x="390525" y="628650"/>
+                    </a:lnTo>
+                    <a:close/>
+                  </a:path>
+                </a:pathLst>
+              </a:custGeom>
+              <a:solidFill>
+                <a:schemeClr val="bg2">
+                  <a:lumMod val="90000"/>
+                </a:schemeClr>
+              </a:solidFill>
+              <a:ln w="38100">
+                <a:solidFill>
+                  <a:schemeClr val="tx1"/>
+                </a:solidFill>
+              </a:ln>
+            </p:spPr>
+            <p:style>
+              <a:lnRef idx="2">
+                <a:schemeClr val="accent1">
+                  <a:shade val="50000"/>
+                </a:schemeClr>
+              </a:lnRef>
+              <a:fillRef idx="1">
+                <a:schemeClr val="accent1"/>
+              </a:fillRef>
+              <a:effectRef idx="0">
+                <a:schemeClr val="accent1"/>
+              </a:effectRef>
+              <a:fontRef idx="minor">
+                <a:schemeClr val="lt1"/>
+              </a:fontRef>
+            </p:style>
+            <p:txBody>
+              <a:bodyPr rtlCol="0" anchor="ctr"/>
+              <a:lstStyle/>
+              <a:p>
+                <a:pPr algn="ctr"/>
+                <a:endParaRPr lang="en-US"/>
+              </a:p>
+            </p:txBody>
+          </p:sp>
+        </p:grpSp>
+      </p:grpSp>
     </p:spTree>
     <p:extLst>
       <p:ext uri="{BB962C8B-B14F-4D97-AF65-F5344CB8AC3E}">

</xml_diff>